<commit_message>
ch 2 updates prior to recording
</commit_message>
<xml_diff>
--- a/ch02/02.04 Which Information Do We Prioritize.pptx
+++ b/ch02/02.04 Which Information Do We Prioritize.pptx
@@ -249,7 +249,7 @@
           <a:p>
             <a:fld id="{B6BED862-AF33-0947-A601-FA6040CBDB50}" type="datetimeFigureOut">
               <a:rPr lang="en-US" smtClean="0"/>
-              <a:t>6/21/19</a:t>
+              <a:t>6/28/19</a:t>
             </a:fld>
             <a:endParaRPr lang="en-US" dirty="0"/>
           </a:p>
@@ -382,17 +382,17 @@
           <a:effectLst/>
           <a:extLst>
             <a:ext uri="{FAA26D3D-D897-4be2-8F04-BA451C77F1D7}">
-              <ma14:placeholderFlag xmlns="" xmlns:ma14="http://schemas.microsoft.com/office/mac/drawingml/2011/main" val="1"/>
+              <ma14:placeholderFlag xmlns:ma14="http://schemas.microsoft.com/office/mac/drawingml/2011/main" xmlns="" val="1"/>
             </a:ext>
             <a:ext uri="{909E8E84-426E-40dd-AFC4-6F175D3DCCD1}">
-              <a14:hiddenFill xmlns:a14="http://schemas.microsoft.com/office/drawing/2010/main" xmlns="">
+              <a14:hiddenFill xmlns="" xmlns:a14="http://schemas.microsoft.com/office/drawing/2010/main">
                 <a:solidFill>
                   <a:schemeClr val="accent1"/>
                 </a:solidFill>
               </a14:hiddenFill>
             </a:ext>
             <a:ext uri="{91240B29-F687-4f45-9708-019B960494DF}">
-              <a14:hiddenLine xmlns:a14="http://schemas.microsoft.com/office/drawing/2010/main" xmlns="" w="9525">
+              <a14:hiddenLine xmlns="" xmlns:a14="http://schemas.microsoft.com/office/drawing/2010/main" w="9525">
                 <a:solidFill>
                   <a:schemeClr val="tx1"/>
                 </a:solidFill>
@@ -402,7 +402,7 @@
               </a14:hiddenLine>
             </a:ext>
             <a:ext uri="{AF507438-7753-43e0-B8FC-AC1667EBCBE1}">
-              <a14:hiddenEffects xmlns:a14="http://schemas.microsoft.com/office/drawing/2010/main" xmlns="">
+              <a14:hiddenEffects xmlns="" xmlns:a14="http://schemas.microsoft.com/office/drawing/2010/main">
                 <a:effectLst>
                   <a:outerShdw blurRad="63500" dist="38099" dir="2700000" algn="ctr" rotWithShape="0">
                     <a:schemeClr val="bg2">
@@ -461,17 +461,17 @@
           <a:effectLst/>
           <a:extLst>
             <a:ext uri="{FAA26D3D-D897-4be2-8F04-BA451C77F1D7}">
-              <ma14:placeholderFlag xmlns="" xmlns:ma14="http://schemas.microsoft.com/office/mac/drawingml/2011/main" val="1"/>
+              <ma14:placeholderFlag xmlns:ma14="http://schemas.microsoft.com/office/mac/drawingml/2011/main" xmlns="" val="1"/>
             </a:ext>
             <a:ext uri="{909E8E84-426E-40dd-AFC4-6F175D3DCCD1}">
-              <a14:hiddenFill xmlns:a14="http://schemas.microsoft.com/office/drawing/2010/main" xmlns="">
+              <a14:hiddenFill xmlns="" xmlns:a14="http://schemas.microsoft.com/office/drawing/2010/main">
                 <a:solidFill>
                   <a:schemeClr val="accent1"/>
                 </a:solidFill>
               </a14:hiddenFill>
             </a:ext>
             <a:ext uri="{91240B29-F687-4f45-9708-019B960494DF}">
-              <a14:hiddenLine xmlns:a14="http://schemas.microsoft.com/office/drawing/2010/main" xmlns="" w="9525">
+              <a14:hiddenLine xmlns="" xmlns:a14="http://schemas.microsoft.com/office/drawing/2010/main" w="9525">
                 <a:solidFill>
                   <a:schemeClr val="tx1"/>
                 </a:solidFill>
@@ -481,7 +481,7 @@
               </a14:hiddenLine>
             </a:ext>
             <a:ext uri="{AF507438-7753-43e0-B8FC-AC1667EBCBE1}">
-              <a14:hiddenEffects xmlns:a14="http://schemas.microsoft.com/office/drawing/2010/main" xmlns="">
+              <a14:hiddenEffects xmlns="" xmlns:a14="http://schemas.microsoft.com/office/drawing/2010/main">
                 <a:effectLst>
                   <a:outerShdw blurRad="63500" dist="38099" dir="2700000" algn="ctr" rotWithShape="0">
                     <a:schemeClr val="bg2">
@@ -545,7 +545,7 @@
           <a:effectLst/>
           <a:extLst>
             <a:ext uri="{AF507438-7753-43e0-B8FC-AC1667EBCBE1}">
-              <a14:hiddenEffects xmlns:a14="http://schemas.microsoft.com/office/drawing/2010/main" xmlns="">
+              <a14:hiddenEffects xmlns="" xmlns:a14="http://schemas.microsoft.com/office/drawing/2010/main">
                 <a:effectLst>
                   <a:outerShdw blurRad="63500" dist="38099" dir="2700000" algn="ctr" rotWithShape="0">
                     <a:srgbClr val="000000">
@@ -556,7 +556,7 @@
               </a14:hiddenEffects>
             </a:ext>
             <a:ext uri="{53640926-AAD7-44d8-BBD7-CCE9431645EC}">
-              <a14:shadowObscured xmlns:a14="http://schemas.microsoft.com/office/drawing/2010/main" xmlns="" val="1"/>
+              <a14:shadowObscured xmlns="" xmlns:a14="http://schemas.microsoft.com/office/drawing/2010/main" val="1"/>
             </a:ext>
           </a:extLst>
         </p:spPr>
@@ -586,17 +586,17 @@
           <a:effectLst/>
           <a:extLst>
             <a:ext uri="{FAA26D3D-D897-4be2-8F04-BA451C77F1D7}">
-              <ma14:placeholderFlag xmlns="" xmlns:ma14="http://schemas.microsoft.com/office/mac/drawingml/2011/main" val="1"/>
+              <ma14:placeholderFlag xmlns:ma14="http://schemas.microsoft.com/office/mac/drawingml/2011/main" xmlns="" val="1"/>
             </a:ext>
             <a:ext uri="{909E8E84-426E-40dd-AFC4-6F175D3DCCD1}">
-              <a14:hiddenFill xmlns:a14="http://schemas.microsoft.com/office/drawing/2010/main" xmlns="">
+              <a14:hiddenFill xmlns="" xmlns:a14="http://schemas.microsoft.com/office/drawing/2010/main">
                 <a:solidFill>
                   <a:schemeClr val="accent1"/>
                 </a:solidFill>
               </a14:hiddenFill>
             </a:ext>
             <a:ext uri="{91240B29-F687-4f45-9708-019B960494DF}">
-              <a14:hiddenLine xmlns:a14="http://schemas.microsoft.com/office/drawing/2010/main" xmlns="" w="9525">
+              <a14:hiddenLine xmlns="" xmlns:a14="http://schemas.microsoft.com/office/drawing/2010/main" w="9525">
                 <a:solidFill>
                   <a:schemeClr val="tx1"/>
                 </a:solidFill>
@@ -606,7 +606,7 @@
               </a14:hiddenLine>
             </a:ext>
             <a:ext uri="{AF507438-7753-43e0-B8FC-AC1667EBCBE1}">
-              <a14:hiddenEffects xmlns:a14="http://schemas.microsoft.com/office/drawing/2010/main" xmlns="">
+              <a14:hiddenEffects xmlns="" xmlns:a14="http://schemas.microsoft.com/office/drawing/2010/main">
                 <a:effectLst>
                   <a:outerShdw blurRad="63500" dist="38099" dir="2700000" algn="ctr" rotWithShape="0">
                     <a:schemeClr val="bg2">
@@ -687,17 +687,17 @@
           <a:effectLst/>
           <a:extLst>
             <a:ext uri="{FAA26D3D-D897-4be2-8F04-BA451C77F1D7}">
-              <ma14:placeholderFlag xmlns="" xmlns:ma14="http://schemas.microsoft.com/office/mac/drawingml/2011/main" val="1"/>
+              <ma14:placeholderFlag xmlns:ma14="http://schemas.microsoft.com/office/mac/drawingml/2011/main" xmlns="" val="1"/>
             </a:ext>
             <a:ext uri="{909E8E84-426E-40dd-AFC4-6F175D3DCCD1}">
-              <a14:hiddenFill xmlns:a14="http://schemas.microsoft.com/office/drawing/2010/main" xmlns="">
+              <a14:hiddenFill xmlns="" xmlns:a14="http://schemas.microsoft.com/office/drawing/2010/main">
                 <a:solidFill>
                   <a:schemeClr val="accent1"/>
                 </a:solidFill>
               </a14:hiddenFill>
             </a:ext>
             <a:ext uri="{91240B29-F687-4f45-9708-019B960494DF}">
-              <a14:hiddenLine xmlns:a14="http://schemas.microsoft.com/office/drawing/2010/main" xmlns="" w="9525">
+              <a14:hiddenLine xmlns="" xmlns:a14="http://schemas.microsoft.com/office/drawing/2010/main" w="9525">
                 <a:solidFill>
                   <a:schemeClr val="tx1"/>
                 </a:solidFill>
@@ -707,7 +707,7 @@
               </a14:hiddenLine>
             </a:ext>
             <a:ext uri="{AF507438-7753-43e0-B8FC-AC1667EBCBE1}">
-              <a14:hiddenEffects xmlns:a14="http://schemas.microsoft.com/office/drawing/2010/main" xmlns="">
+              <a14:hiddenEffects xmlns="" xmlns:a14="http://schemas.microsoft.com/office/drawing/2010/main">
                 <a:effectLst>
                   <a:outerShdw blurRad="63500" dist="38099" dir="2700000" algn="ctr" rotWithShape="0">
                     <a:schemeClr val="bg2">
@@ -766,17 +766,17 @@
           <a:effectLst/>
           <a:extLst>
             <a:ext uri="{FAA26D3D-D897-4be2-8F04-BA451C77F1D7}">
-              <ma14:placeholderFlag xmlns="" xmlns:ma14="http://schemas.microsoft.com/office/mac/drawingml/2011/main" val="1"/>
+              <ma14:placeholderFlag xmlns:ma14="http://schemas.microsoft.com/office/mac/drawingml/2011/main" xmlns="" val="1"/>
             </a:ext>
             <a:ext uri="{909E8E84-426E-40dd-AFC4-6F175D3DCCD1}">
-              <a14:hiddenFill xmlns:a14="http://schemas.microsoft.com/office/drawing/2010/main" xmlns="">
+              <a14:hiddenFill xmlns="" xmlns:a14="http://schemas.microsoft.com/office/drawing/2010/main">
                 <a:solidFill>
                   <a:schemeClr val="accent1"/>
                 </a:solidFill>
               </a14:hiddenFill>
             </a:ext>
             <a:ext uri="{91240B29-F687-4f45-9708-019B960494DF}">
-              <a14:hiddenLine xmlns:a14="http://schemas.microsoft.com/office/drawing/2010/main" xmlns="" w="9525">
+              <a14:hiddenLine xmlns="" xmlns:a14="http://schemas.microsoft.com/office/drawing/2010/main" w="9525">
                 <a:solidFill>
                   <a:schemeClr val="tx1"/>
                 </a:solidFill>
@@ -786,7 +786,7 @@
               </a14:hiddenLine>
             </a:ext>
             <a:ext uri="{AF507438-7753-43e0-B8FC-AC1667EBCBE1}">
-              <a14:hiddenEffects xmlns:a14="http://schemas.microsoft.com/office/drawing/2010/main" xmlns="">
+              <a14:hiddenEffects xmlns="" xmlns:a14="http://schemas.microsoft.com/office/drawing/2010/main">
                 <a:effectLst>
                   <a:outerShdw blurRad="63500" dist="38099" dir="2700000" algn="ctr" rotWithShape="0">
                     <a:schemeClr val="bg2">
@@ -1631,7 +1631,7 @@
               </a14:hiddenLine>
             </a:ext>
             <a:ext uri="{FAA26D3D-D897-4be2-8F04-BA451C77F1D7}">
-              <ma14:placeholderFlag xmlns="" xmlns:ma14="http://schemas.microsoft.com/office/mac/drawingml/2011/main" val="1"/>
+              <ma14:placeholderFlag xmlns:ma14="http://schemas.microsoft.com/office/mac/drawingml/2011/main" xmlns="" val="1"/>
             </a:ext>
           </a:extLst>
         </p:spPr>
@@ -2553,14 +2553,14 @@
           </a:ln>
           <a:extLst>
             <a:ext uri="{909E8E84-426E-40dd-AFC4-6F175D3DCCD1}">
-              <a14:hiddenFill xmlns:a14="http://schemas.microsoft.com/office/drawing/2010/main" xmlns="">
+              <a14:hiddenFill xmlns="" xmlns:a14="http://schemas.microsoft.com/office/drawing/2010/main">
                 <a:solidFill>
                   <a:srgbClr val="FFFFFF"/>
                 </a:solidFill>
               </a14:hiddenFill>
             </a:ext>
             <a:ext uri="{91240B29-F687-4f45-9708-019B960494DF}">
-              <a14:hiddenLine xmlns:a14="http://schemas.microsoft.com/office/drawing/2010/main" xmlns="" w="9525">
+              <a14:hiddenLine xmlns="" xmlns:a14="http://schemas.microsoft.com/office/drawing/2010/main" w="9525">
                 <a:solidFill>
                   <a:srgbClr val="000000"/>
                 </a:solidFill>
@@ -4275,29 +4275,7 @@
                   </a:schemeClr>
                 </a:solidFill>
               </a:rPr>
-              <a:t>Most </a:t>
-            </a:r>
-            <a:r>
-              <a:rPr lang="en-US" sz="3600" dirty="0" err="1">
-                <a:solidFill>
-                  <a:schemeClr val="tx1">
-                    <a:lumMod val="85000"/>
-                    <a:lumOff val="15000"/>
-                  </a:schemeClr>
-                </a:solidFill>
-              </a:rPr>
-              <a:t>valueable</a:t>
-            </a:r>
-            <a:r>
-              <a:rPr lang="en-US" sz="3600" dirty="0">
-                <a:solidFill>
-                  <a:schemeClr val="tx1">
-                    <a:lumMod val="85000"/>
-                    <a:lumOff val="15000"/>
-                  </a:schemeClr>
-                </a:solidFill>
-              </a:rPr>
-              <a:t> customers to be maintained, middle to be upsold, bottom to not disrupt the business model</a:t>
+              <a:t>Most valuable customers to be maintained, middle to be upsold, bottom to not disrupt the business model</a:t>
             </a:r>
           </a:p>
           <a:p>
@@ -4399,6 +4377,27 @@
                 </a:schemeClr>
               </a:solidFill>
             </a:endParaRPr>
+          </a:p>
+          <a:p>
+            <a:pPr>
+              <a:spcBef>
+                <a:spcPts val="0"/>
+              </a:spcBef>
+              <a:spcAft>
+                <a:spcPts val="600"/>
+              </a:spcAft>
+            </a:pPr>
+            <a:r>
+              <a:rPr lang="en-US" sz="3600" dirty="0">
+                <a:solidFill>
+                  <a:schemeClr val="tx1">
+                    <a:lumMod val="85000"/>
+                    <a:lumOff val="15000"/>
+                  </a:schemeClr>
+                </a:solidFill>
+              </a:rPr>
+              <a:t>A priori segments (i.e. value)</a:t>
+            </a:r>
           </a:p>
           <a:p>
             <a:pPr>

</xml_diff>